<commit_message>
Update PowerPoint with embedded screenshots
</commit_message>
<xml_diff>
--- a/Harness_Lab_Presentation.pptx
+++ b/Harness_Lab_Presentation.pptx
@@ -3235,8 +3235,8 @@
         </p:nvSpPr>
         <p:spPr>
           <a:xfrm>
-            <a:off x="457200" y="365760"/>
-            <a:ext cx="11277295" cy="731520"/>
+            <a:off x="457200" y="274320"/>
+            <a:ext cx="11277295" cy="548640"/>
           </a:xfrm>
           <a:prstGeom prst="rect">
             <a:avLst/>
@@ -3250,7 +3250,7 @@
           <a:lstStyle/>
           <a:p>
             <a:pPr>
-              <a:defRPr sz="3200" b="1">
+              <a:defRPr sz="2800" b="1">
                 <a:solidFill>
                   <a:srgbClr val="009682"/>
                 </a:solidFill>
@@ -3271,8 +3271,8 @@
           <p:nvPr/>
         </p:nvGraphicFramePr>
         <p:xfrm>
-          <a:off x="640080" y="1280160"/>
-          <a:ext cx="10881360" cy="1828800"/>
+          <a:off x="457200" y="914400"/>
+          <a:ext cx="6400800" cy="1645920"/>
         </p:xfrm>
         <a:graphic>
           <a:graphicData uri="http://schemas.openxmlformats.org/drawingml/2006/table">
@@ -3281,17 +3281,17 @@
                 <a:tableStyleId>{5C22544A-7EE6-4342-B048-85BDC9FD1C3A}</a:tableStyleId>
               </a:tblPr>
               <a:tblGrid>
-                <a:gridCol w="5440680"/>
-                <a:gridCol w="5440680"/>
+                <a:gridCol w="3200400"/>
+                <a:gridCol w="3200400"/>
               </a:tblGrid>
-              <a:tr h="457200">
+              <a:tr h="411480">
                 <a:tc>
                   <a:txBody>
                     <a:bodyPr/>
                     <a:lstStyle/>
                     <a:p>
                       <a:pPr>
-                        <a:defRPr b="1" sz="1400">
+                        <a:defRPr b="1" sz="1200">
                           <a:solidFill>
                             <a:srgbClr val="FFFFFF"/>
                           </a:solidFill>
@@ -3314,7 +3314,7 @@
                     <a:lstStyle/>
                     <a:p>
                       <a:pPr>
-                        <a:defRPr b="1" sz="1400">
+                        <a:defRPr b="1" sz="1200">
                           <a:solidFill>
                             <a:srgbClr val="FFFFFF"/>
                           </a:solidFill>
@@ -3332,14 +3332,14 @@
                   </a:tcPr>
                 </a:tc>
               </a:tr>
-              <a:tr h="457200">
+              <a:tr h="411480">
                 <a:tc>
                   <a:txBody>
                     <a:bodyPr/>
                     <a:lstStyle/>
                     <a:p>
                       <a:pPr>
-                        <a:defRPr sz="1300"/>
+                        <a:defRPr sz="1100"/>
                       </a:pPr>
                       <a:r>
                         <a:t>GET /</a:t>
@@ -3354,7 +3354,7 @@
                     <a:lstStyle/>
                     <a:p>
                       <a:pPr>
-                        <a:defRPr sz="1300"/>
+                        <a:defRPr sz="1100"/>
                       </a:pPr>
                       <a:r>
                         <a:t>{"message":"Welcome to Harness CI Lab!"}</a:t>
@@ -3364,14 +3364,14 @@
                   <a:tcPr/>
                 </a:tc>
               </a:tr>
-              <a:tr h="457200">
+              <a:tr h="411480">
                 <a:tc>
                   <a:txBody>
                     <a:bodyPr/>
                     <a:lstStyle/>
                     <a:p>
                       <a:pPr>
-                        <a:defRPr sz="1300"/>
+                        <a:defRPr sz="1100"/>
                       </a:pPr>
                       <a:r>
                         <a:t>GET /health</a:t>
@@ -3386,24 +3386,24 @@
                     <a:lstStyle/>
                     <a:p>
                       <a:pPr>
-                        <a:defRPr sz="1300"/>
+                        <a:defRPr sz="1100"/>
                       </a:pPr>
                       <a:r>
-                        <a:t>{"status":"healthy","timestamp":"..."}</a:t>
+                        <a:t>{"status":"healthy"}</a:t>
                       </a:r>
                     </a:p>
                   </a:txBody>
                   <a:tcPr/>
                 </a:tc>
               </a:tr>
-              <a:tr h="457200">
+              <a:tr h="411480">
                 <a:tc>
                   <a:txBody>
                     <a:bodyPr/>
                     <a:lstStyle/>
                     <a:p>
                       <a:pPr>
-                        <a:defRPr sz="1300"/>
+                        <a:defRPr sz="1100"/>
                       </a:pPr>
                       <a:r>
                         <a:t>GET /api/info</a:t>
@@ -3418,7 +3418,7 @@
                     <a:lstStyle/>
                     <a:p>
                       <a:pPr>
-                        <a:defRPr sz="1300"/>
+                        <a:defRPr sz="1100"/>
                       </a:pPr>
                       <a:r>
                         <a:t>{"app":"harness-ci-lab","version":"1.0.0"}</a:t>
@@ -3432,16 +3432,40 @@
           </a:graphicData>
         </a:graphic>
       </p:graphicFrame>
-      <p:sp>
-        <p:nvSpPr>
-          <p:cNvPr id="4" name="TextBox 3"/>
+      <p:pic>
+        <p:nvPicPr>
+          <p:cNvPr id="4" name="Picture 3" descr="live-app-response.png"/>
+          <p:cNvPicPr>
+            <a:picLocks noChangeAspect="1"/>
+          </p:cNvPicPr>
+          <p:nvPr/>
+        </p:nvPicPr>
+        <p:blipFill>
+          <a:blip r:embed="rId2"/>
+          <a:stretch>
+            <a:fillRect/>
+          </a:stretch>
+        </p:blipFill>
+        <p:spPr>
+          <a:xfrm>
+            <a:off x="7132320" y="914400"/>
+            <a:ext cx="4572000" cy="1540565"/>
+          </a:xfrm>
+          <a:prstGeom prst="rect">
+            <a:avLst/>
+          </a:prstGeom>
+        </p:spPr>
+      </p:pic>
+      <p:sp>
+        <p:nvSpPr>
+          <p:cNvPr id="5" name="TextBox 4"/>
           <p:cNvSpPr txBox="1"/>
           <p:nvPr/>
         </p:nvSpPr>
         <p:spPr>
           <a:xfrm>
-            <a:off x="640080" y="4114800"/>
-            <a:ext cx="10058400" cy="1371600"/>
+            <a:off x="457200" y="2926080"/>
+            <a:ext cx="10972800" cy="914400"/>
           </a:xfrm>
           <a:prstGeom prst="rect">
             <a:avLst/>
@@ -3455,14 +3479,6 @@
           <a:lstStyle/>
           <a:p>
             <a:pPr>
-              <a:defRPr sz="1600" b="1"/>
-            </a:pPr>
-            <a:r>
-              <a:t>Live URL:</a:t>
-            </a:r>
-          </a:p>
-          <a:p>
-            <a:pPr>
               <a:defRPr sz="1400">
                 <a:solidFill>
                   <a:srgbClr val="009682"/>
@@ -3470,20 +3486,7 @@
               </a:defRPr>
             </a:pPr>
             <a:r>
-              <a:t>http://af8ff179d9b434e3896b72ce0a902e3d-613870465.us-east-1.elb.amazonaws.com</a:t>
-            </a:r>
-          </a:p>
-          <a:p/>
-          <a:p>
-            <a:pPr>
-              <a:defRPr sz="1400" i="1">
-                <a:solidFill>
-                  <a:srgbClr val="969696"/>
-                </a:solidFill>
-              </a:defRPr>
-            </a:pPr>
-            <a:r>
-              <a:t>[INSERT SCREENSHOT: screenshots/live-app-response.png]</a:t>
+              <a:t>Live URL: http://af8ff179d9b434e3896b72ce0a902e3d-613870465.us-east-1.elb.amazonaws.com</a:t>
             </a:r>
           </a:p>
         </p:txBody>
@@ -5025,33 +5028,6 @@
               <a:t>• Single platform for CI + CD</a:t>
             </a:r>
           </a:p>
-          <a:p>
-            <a:pPr>
-              <a:spcAft>
-                <a:spcPts val="800"/>
-              </a:spcAft>
-              <a:defRPr sz="2000">
-                <a:solidFill>
-                  <a:srgbClr val="323232"/>
-                </a:solidFill>
-              </a:defRPr>
-            </a:pPr>
-          </a:p>
-          <a:p>
-            <a:pPr>
-              <a:spcAft>
-                <a:spcPts val="800"/>
-              </a:spcAft>
-              <a:defRPr sz="2000">
-                <a:solidFill>
-                  <a:srgbClr val="323232"/>
-                </a:solidFill>
-              </a:defRPr>
-            </a:pPr>
-            <a:r>
-              <a:t>[INSERT: Architecture diagram]</a:t>
-            </a:r>
-          </a:p>
         </p:txBody>
       </p:sp>
     </p:spTree>
@@ -5080,8 +5056,8 @@
         </p:nvSpPr>
         <p:spPr>
           <a:xfrm>
-            <a:off x="457200" y="365760"/>
-            <a:ext cx="11277295" cy="731520"/>
+            <a:off x="457200" y="274320"/>
+            <a:ext cx="11277295" cy="548640"/>
           </a:xfrm>
           <a:prstGeom prst="rect">
             <a:avLst/>
@@ -5095,7 +5071,7 @@
           <a:lstStyle/>
           <a:p>
             <a:pPr>
-              <a:defRPr sz="3200" b="1">
+              <a:defRPr sz="2800" b="1">
                 <a:solidFill>
                   <a:srgbClr val="009682"/>
                 </a:solidFill>
@@ -5116,8 +5092,8 @@
           <p:nvPr/>
         </p:nvGraphicFramePr>
         <p:xfrm>
-          <a:off x="640080" y="1280160"/>
-          <a:ext cx="10881360" cy="1828800"/>
+          <a:off x="457200" y="914400"/>
+          <a:ext cx="5486400" cy="1463040"/>
         </p:xfrm>
         <a:graphic>
           <a:graphicData uri="http://schemas.openxmlformats.org/drawingml/2006/table">
@@ -5126,18 +5102,18 @@
                 <a:tableStyleId>{5C22544A-7EE6-4342-B048-85BDC9FD1C3A}</a:tableStyleId>
               </a:tblPr>
               <a:tblGrid>
-                <a:gridCol w="3627120"/>
-                <a:gridCol w="3627120"/>
-                <a:gridCol w="3627120"/>
+                <a:gridCol w="1828800"/>
+                <a:gridCol w="1828800"/>
+                <a:gridCol w="1828800"/>
               </a:tblGrid>
-              <a:tr h="457200">
+              <a:tr h="365760">
                 <a:tc>
                   <a:txBody>
                     <a:bodyPr/>
                     <a:lstStyle/>
                     <a:p>
                       <a:pPr>
-                        <a:defRPr b="1" sz="1400">
+                        <a:defRPr b="1" sz="1100">
                           <a:solidFill>
                             <a:srgbClr val="FFFFFF"/>
                           </a:solidFill>
@@ -5160,7 +5136,7 @@
                     <a:lstStyle/>
                     <a:p>
                       <a:pPr>
-                        <a:defRPr b="1" sz="1400">
+                        <a:defRPr b="1" sz="1100">
                           <a:solidFill>
                             <a:srgbClr val="FFFFFF"/>
                           </a:solidFill>
@@ -5183,7 +5159,7 @@
                     <a:lstStyle/>
                     <a:p>
                       <a:pPr>
-                        <a:defRPr b="1" sz="1400">
+                        <a:defRPr b="1" sz="1100">
                           <a:solidFill>
                             <a:srgbClr val="FFFFFF"/>
                           </a:solidFill>
@@ -5201,14 +5177,14 @@
                   </a:tcPr>
                 </a:tc>
               </a:tr>
-              <a:tr h="457200">
+              <a:tr h="365760">
                 <a:tc>
                   <a:txBody>
                     <a:bodyPr/>
                     <a:lstStyle/>
                     <a:p>
                       <a:pPr>
-                        <a:defRPr sz="1300"/>
+                        <a:defRPr sz="1000"/>
                       </a:pPr>
                       <a:r>
                         <a:t>github-connector</a:t>
@@ -5223,10 +5199,10 @@
                     <a:lstStyle/>
                     <a:p>
                       <a:pPr>
-                        <a:defRPr sz="1300"/>
+                        <a:defRPr sz="1000"/>
                       </a:pPr>
                       <a:r>
-                        <a:t>Source code repository</a:t>
+                        <a:t>Source code</a:t>
                       </a:r>
                     </a:p>
                   </a:txBody>
@@ -5238,7 +5214,7 @@
                     <a:lstStyle/>
                     <a:p>
                       <a:pPr>
-                        <a:defRPr sz="1300"/>
+                        <a:defRPr sz="1000"/>
                       </a:pPr>
                       <a:r>
                         <a:t>✓ Connected</a:t>
@@ -5248,14 +5224,14 @@
                   <a:tcPr/>
                 </a:tc>
               </a:tr>
-              <a:tr h="457200">
+              <a:tr h="365760">
                 <a:tc>
                   <a:txBody>
                     <a:bodyPr/>
                     <a:lstStyle/>
                     <a:p>
                       <a:pPr>
-                        <a:defRPr sz="1300"/>
+                        <a:defRPr sz="1000"/>
                       </a:pPr>
                       <a:r>
                         <a:t>dockerhub-connector</a:t>
@@ -5270,7 +5246,7 @@
                     <a:lstStyle/>
                     <a:p>
                       <a:pPr>
-                        <a:defRPr sz="1300"/>
+                        <a:defRPr sz="1000"/>
                       </a:pPr>
                       <a:r>
                         <a:t>Container registry</a:t>
@@ -5285,7 +5261,7 @@
                     <a:lstStyle/>
                     <a:p>
                       <a:pPr>
-                        <a:defRPr sz="1300"/>
+                        <a:defRPr sz="1000"/>
                       </a:pPr>
                       <a:r>
                         <a:t>✓ Connected</a:t>
@@ -5295,14 +5271,14 @@
                   <a:tcPr/>
                 </a:tc>
               </a:tr>
-              <a:tr h="457200">
+              <a:tr h="365760">
                 <a:tc>
                   <a:txBody>
                     <a:bodyPr/>
                     <a:lstStyle/>
                     <a:p>
                       <a:pPr>
-                        <a:defRPr sz="1300"/>
+                        <a:defRPr sz="1000"/>
                       </a:pPr>
                       <a:r>
                         <a:t>k8s-connector</a:t>
@@ -5317,10 +5293,10 @@
                     <a:lstStyle/>
                     <a:p>
                       <a:pPr>
-                        <a:defRPr sz="1300"/>
+                        <a:defRPr sz="1000"/>
                       </a:pPr>
                       <a:r>
-                        <a:t>EKS cluster (via Delegate)</a:t>
+                        <a:t>EKS cluster</a:t>
                       </a:r>
                     </a:p>
                   </a:txBody>
@@ -5332,7 +5308,7 @@
                     <a:lstStyle/>
                     <a:p>
                       <a:pPr>
-                        <a:defRPr sz="1300"/>
+                        <a:defRPr sz="1000"/>
                       </a:pPr>
                       <a:r>
                         <a:t>✓ Connected</a:t>
@@ -5346,41 +5322,30 @@
           </a:graphicData>
         </a:graphic>
       </p:graphicFrame>
-      <p:sp>
-        <p:nvSpPr>
-          <p:cNvPr id="4" name="TextBox 3"/>
-          <p:cNvSpPr txBox="1"/>
+      <p:pic>
+        <p:nvPicPr>
+          <p:cNvPr id="4" name="Picture 3" descr="connectors.png"/>
+          <p:cNvPicPr>
+            <a:picLocks noChangeAspect="1"/>
+          </p:cNvPicPr>
           <p:nvPr/>
-        </p:nvSpPr>
+        </p:nvPicPr>
+        <p:blipFill>
+          <a:blip r:embed="rId2"/>
+          <a:stretch>
+            <a:fillRect/>
+          </a:stretch>
+        </p:blipFill>
         <p:spPr>
           <a:xfrm>
-            <a:off x="640080" y="4114800"/>
-            <a:ext cx="10058400" cy="457200"/>
+            <a:off x="6217920" y="914400"/>
+            <a:ext cx="5486400" cy="2617963"/>
           </a:xfrm>
           <a:prstGeom prst="rect">
             <a:avLst/>
           </a:prstGeom>
-          <a:noFill/>
         </p:spPr>
-        <p:txBody>
-          <a:bodyPr wrap="none">
-            <a:spAutoFit/>
-          </a:bodyPr>
-          <a:lstStyle/>
-          <a:p>
-            <a:pPr>
-              <a:defRPr sz="1400" i="1">
-                <a:solidFill>
-                  <a:srgbClr val="969696"/>
-                </a:solidFill>
-              </a:defRPr>
-            </a:pPr>
-            <a:r>
-              <a:t>[INSERT SCREENSHOT: screenshots/connectors.png]</a:t>
-            </a:r>
-          </a:p>
-        </p:txBody>
-      </p:sp>
+      </p:pic>
     </p:spTree>
   </p:cSld>
   <p:clrMapOvr>
@@ -5407,8 +5372,8 @@
         </p:nvSpPr>
         <p:spPr>
           <a:xfrm>
-            <a:off x="457200" y="365760"/>
-            <a:ext cx="11277295" cy="731520"/>
+            <a:off x="457200" y="274320"/>
+            <a:ext cx="11277295" cy="548640"/>
           </a:xfrm>
           <a:prstGeom prst="rect">
             <a:avLst/>
@@ -5422,7 +5387,7 @@
           <a:lstStyle/>
           <a:p>
             <a:pPr>
-              <a:defRPr sz="3200" b="1">
+              <a:defRPr sz="2800" b="1">
                 <a:solidFill>
                   <a:srgbClr val="009682"/>
                 </a:solidFill>
@@ -5442,8 +5407,8 @@
         </p:nvSpPr>
         <p:spPr>
           <a:xfrm>
-            <a:off x="640080" y="1280160"/>
-            <a:ext cx="10972800" cy="5029200"/>
+            <a:off x="457200" y="914400"/>
+            <a:ext cx="5029200" cy="3657600"/>
           </a:xfrm>
           <a:prstGeom prst="rect">
             <a:avLst/>
@@ -5457,10 +5422,7 @@
           <a:lstStyle/>
           <a:p>
             <a:pPr>
-              <a:spcAft>
-                <a:spcPts val="800"/>
-              </a:spcAft>
-              <a:defRPr sz="2000">
+              <a:defRPr sz="1600">
                 <a:solidFill>
                   <a:srgbClr val="323232"/>
                 </a:solidFill>
@@ -5472,25 +5434,19 @@
           </a:p>
           <a:p>
             <a:pPr>
-              <a:spcAft>
-                <a:spcPts val="800"/>
-              </a:spcAft>
-              <a:defRPr sz="2000">
+              <a:defRPr sz="1600">
                 <a:solidFill>
                   <a:srgbClr val="323232"/>
                 </a:solidFill>
               </a:defRPr>
             </a:pPr>
             <a:r>
-              <a:t>   • Clone repository from GitHub</a:t>
+              <a:t>   • Clone from GitHub</a:t>
             </a:r>
           </a:p>
           <a:p>
             <a:pPr>
-              <a:spcAft>
-                <a:spcPts val="800"/>
-              </a:spcAft>
-              <a:defRPr sz="2000">
+              <a:defRPr sz="1600">
                 <a:solidFill>
                   <a:srgbClr val="323232"/>
                 </a:solidFill>
@@ -5502,25 +5458,19 @@
           </a:p>
           <a:p>
             <a:pPr>
-              <a:spcAft>
-                <a:spcPts val="800"/>
-              </a:spcAft>
-              <a:defRPr sz="2000">
+              <a:defRPr sz="1600">
                 <a:solidFill>
                   <a:srgbClr val="323232"/>
                 </a:solidFill>
               </a:defRPr>
             </a:pPr>
             <a:r>
-              <a:t>   • Build &amp; Push Docker image to DockerHub</a:t>
+              <a:t>   • Build &amp; Push Docker image</a:t>
             </a:r>
           </a:p>
           <a:p>
             <a:pPr>
-              <a:spcAft>
-                <a:spcPts val="800"/>
-              </a:spcAft>
-              <a:defRPr sz="2000">
+              <a:defRPr sz="1600">
                 <a:solidFill>
                   <a:srgbClr val="323232"/>
                 </a:solidFill>
@@ -5529,10 +5479,7 @@
           </a:p>
           <a:p>
             <a:pPr>
-              <a:spcAft>
-                <a:spcPts val="800"/>
-              </a:spcAft>
-              <a:defRPr sz="2000">
+              <a:defRPr sz="1600">
                 <a:solidFill>
                   <a:srgbClr val="323232"/>
                 </a:solidFill>
@@ -5544,40 +5491,31 @@
           </a:p>
           <a:p>
             <a:pPr>
-              <a:spcAft>
-                <a:spcPts val="800"/>
-              </a:spcAft>
-              <a:defRPr sz="2000">
+              <a:defRPr sz="1600">
                 <a:solidFill>
                   <a:srgbClr val="323232"/>
                 </a:solidFill>
               </a:defRPr>
             </a:pPr>
             <a:r>
-              <a:t>   • Canary deployment (1 pod first)</a:t>
+              <a:t>   • Canary deployment (1 pod)</a:t>
             </a:r>
           </a:p>
           <a:p>
             <a:pPr>
-              <a:spcAft>
-                <a:spcPts val="800"/>
-              </a:spcAft>
-              <a:defRPr sz="2000">
+              <a:defRPr sz="1600">
                 <a:solidFill>
                   <a:srgbClr val="323232"/>
                 </a:solidFill>
               </a:defRPr>
             </a:pPr>
             <a:r>
-              <a:t>   • Validate health checks</a:t>
+              <a:t>   • Validate health</a:t>
             </a:r>
           </a:p>
           <a:p>
             <a:pPr>
-              <a:spcAft>
-                <a:spcPts val="800"/>
-              </a:spcAft>
-              <a:defRPr sz="2000">
+              <a:defRPr sz="1600">
                 <a:solidFill>
                   <a:srgbClr val="323232"/>
                 </a:solidFill>
@@ -5587,35 +5525,32 @@
               <a:t>   • Rolling deployment (all pods)</a:t>
             </a:r>
           </a:p>
-          <a:p>
-            <a:pPr>
-              <a:spcAft>
-                <a:spcPts val="800"/>
-              </a:spcAft>
-              <a:defRPr sz="2000">
-                <a:solidFill>
-                  <a:srgbClr val="323232"/>
-                </a:solidFill>
-              </a:defRPr>
-            </a:pPr>
-          </a:p>
-          <a:p>
-            <a:pPr>
-              <a:spcAft>
-                <a:spcPts val="800"/>
-              </a:spcAft>
-              <a:defRPr sz="2000">
-                <a:solidFill>
-                  <a:srgbClr val="323232"/>
-                </a:solidFill>
-              </a:defRPr>
-            </a:pPr>
-            <a:r>
-              <a:t>[INSERT SCREENSHOT: screenshots/pipeline-visual.png]</a:t>
-            </a:r>
-          </a:p>
-        </p:txBody>
-      </p:sp>
+        </p:txBody>
+      </p:sp>
+      <p:pic>
+        <p:nvPicPr>
+          <p:cNvPr id="4" name="Picture 3" descr="pipeline-visual.png"/>
+          <p:cNvPicPr>
+            <a:picLocks noChangeAspect="1"/>
+          </p:cNvPicPr>
+          <p:nvPr/>
+        </p:nvPicPr>
+        <p:blipFill>
+          <a:blip r:embed="rId2"/>
+          <a:stretch>
+            <a:fillRect/>
+          </a:stretch>
+        </p:blipFill>
+        <p:spPr>
+          <a:xfrm>
+            <a:off x="5760720" y="914400"/>
+            <a:ext cx="5943600" cy="3228891"/>
+          </a:xfrm>
+          <a:prstGeom prst="rect">
+            <a:avLst/>
+          </a:prstGeom>
+        </p:spPr>
+      </p:pic>
     </p:spTree>
   </p:cSld>
   <p:clrMapOvr>
@@ -5879,8 +5814,8 @@
         </p:nvSpPr>
         <p:spPr>
           <a:xfrm>
-            <a:off x="640080" y="4389120"/>
-            <a:ext cx="10058400" cy="914400"/>
+            <a:off x="640080" y="4114800"/>
+            <a:ext cx="10058400" cy="1097280"/>
           </a:xfrm>
           <a:prstGeom prst="rect">
             <a:avLst/>
@@ -5952,8 +5887,8 @@
         </p:nvSpPr>
         <p:spPr>
           <a:xfrm>
-            <a:off x="457200" y="365760"/>
-            <a:ext cx="11277295" cy="731520"/>
+            <a:off x="457200" y="274320"/>
+            <a:ext cx="11277295" cy="548640"/>
           </a:xfrm>
           <a:prstGeom prst="rect">
             <a:avLst/>
@@ -5967,7 +5902,7 @@
           <a:lstStyle/>
           <a:p>
             <a:pPr>
-              <a:defRPr sz="3200" b="1">
+              <a:defRPr sz="2800" b="1">
                 <a:solidFill>
                   <a:srgbClr val="009682"/>
                 </a:solidFill>
@@ -5979,16 +5914,40 @@
           </a:p>
         </p:txBody>
       </p:sp>
-      <p:sp>
-        <p:nvSpPr>
-          <p:cNvPr id="3" name="TextBox 2"/>
+      <p:pic>
+        <p:nvPicPr>
+          <p:cNvPr id="3" name="Picture 2" descr="pipeline-executions.png"/>
+          <p:cNvPicPr>
+            <a:picLocks noChangeAspect="1"/>
+          </p:cNvPicPr>
+          <p:nvPr/>
+        </p:nvPicPr>
+        <p:blipFill>
+          <a:blip r:embed="rId2"/>
+          <a:stretch>
+            <a:fillRect/>
+          </a:stretch>
+        </p:blipFill>
+        <p:spPr>
+          <a:xfrm>
+            <a:off x="457200" y="1005840"/>
+            <a:ext cx="11247120" cy="5341324"/>
+          </a:xfrm>
+          <a:prstGeom prst="rect">
+            <a:avLst/>
+          </a:prstGeom>
+        </p:spPr>
+      </p:pic>
+      <p:sp>
+        <p:nvSpPr>
+          <p:cNvPr id="4" name="TextBox 3"/>
           <p:cNvSpPr txBox="1"/>
           <p:nvPr/>
         </p:nvSpPr>
         <p:spPr>
           <a:xfrm>
-            <a:off x="640080" y="1280160"/>
-            <a:ext cx="10972800" cy="5029200"/>
+            <a:off x="457200" y="4572000"/>
+            <a:ext cx="5486400" cy="1828800"/>
           </a:xfrm>
           <a:prstGeom prst="rect">
             <a:avLst/>
@@ -5996,167 +5955,55 @@
           <a:noFill/>
         </p:spPr>
         <p:txBody>
-          <a:bodyPr wrap="square">
+          <a:bodyPr wrap="none">
             <a:spAutoFit/>
           </a:bodyPr>
           <a:lstStyle/>
           <a:p>
             <a:pPr>
-              <a:spcAft>
-                <a:spcPts val="800"/>
-              </a:spcAft>
-              <a:defRPr sz="2000">
-                <a:solidFill>
-                  <a:srgbClr val="323232"/>
-                </a:solidFill>
-              </a:defRPr>
-            </a:pPr>
-            <a:r>
-              <a:t>CI Stage Results:</a:t>
-            </a:r>
-          </a:p>
+              <a:defRPr sz="1600" b="1">
+                <a:solidFill>
+                  <a:srgbClr val="009682"/>
+                </a:solidFill>
+              </a:defRPr>
+            </a:pPr>
+            <a:r>
+              <a:t>CI Results: ✓ Clone ✓ Test ✓ Push</a:t>
+            </a:r>
+          </a:p>
+        </p:txBody>
+      </p:sp>
+      <p:sp>
+        <p:nvSpPr>
+          <p:cNvPr id="5" name="TextBox 4"/>
+          <p:cNvSpPr txBox="1"/>
+          <p:nvPr/>
+        </p:nvSpPr>
+        <p:spPr>
+          <a:xfrm>
+            <a:off x="5943600" y="4572000"/>
+            <a:ext cx="5486400" cy="1828800"/>
+          </a:xfrm>
+          <a:prstGeom prst="rect">
+            <a:avLst/>
+          </a:prstGeom>
+          <a:noFill/>
+        </p:spPr>
+        <p:txBody>
+          <a:bodyPr wrap="none">
+            <a:spAutoFit/>
+          </a:bodyPr>
+          <a:lstStyle/>
           <a:p>
             <a:pPr>
-              <a:spcAft>
-                <a:spcPts val="800"/>
-              </a:spcAft>
-              <a:defRPr sz="2000">
-                <a:solidFill>
-                  <a:srgbClr val="323232"/>
-                </a:solidFill>
-              </a:defRPr>
-            </a:pPr>
-            <a:r>
-              <a:t>   ✓ Code cloned from GitHub</a:t>
-            </a:r>
-          </a:p>
-          <a:p>
-            <a:pPr>
-              <a:spcAft>
-                <a:spcPts val="800"/>
-              </a:spcAft>
-              <a:defRPr sz="2000">
-                <a:solidFill>
-                  <a:srgbClr val="323232"/>
-                </a:solidFill>
-              </a:defRPr>
-            </a:pPr>
-            <a:r>
-              <a:t>   ✓ Tests passed (npm test)</a:t>
-            </a:r>
-          </a:p>
-          <a:p>
-            <a:pPr>
-              <a:spcAft>
-                <a:spcPts val="800"/>
-              </a:spcAft>
-              <a:defRPr sz="2000">
-                <a:solidFill>
-                  <a:srgbClr val="323232"/>
-                </a:solidFill>
-              </a:defRPr>
-            </a:pPr>
-            <a:r>
-              <a:t>   ✓ Docker image pushed to DockerHub</a:t>
-            </a:r>
-          </a:p>
-          <a:p>
-            <a:pPr>
-              <a:spcAft>
-                <a:spcPts val="800"/>
-              </a:spcAft>
-              <a:defRPr sz="2000">
-                <a:solidFill>
-                  <a:srgbClr val="323232"/>
-                </a:solidFill>
-              </a:defRPr>
-            </a:pPr>
-          </a:p>
-          <a:p>
-            <a:pPr>
-              <a:spcAft>
-                <a:spcPts val="800"/>
-              </a:spcAft>
-              <a:defRPr sz="2000">
-                <a:solidFill>
-                  <a:srgbClr val="323232"/>
-                </a:solidFill>
-              </a:defRPr>
-            </a:pPr>
-            <a:r>
-              <a:t>CD Stage Results:</a:t>
-            </a:r>
-          </a:p>
-          <a:p>
-            <a:pPr>
-              <a:spcAft>
-                <a:spcPts val="800"/>
-              </a:spcAft>
-              <a:defRPr sz="2000">
-                <a:solidFill>
-                  <a:srgbClr val="323232"/>
-                </a:solidFill>
-              </a:defRPr>
-            </a:pPr>
-            <a:r>
-              <a:t>   ✓ Canary deployed (1 pod)</a:t>
-            </a:r>
-          </a:p>
-          <a:p>
-            <a:pPr>
-              <a:spcAft>
-                <a:spcPts val="800"/>
-              </a:spcAft>
-              <a:defRPr sz="2000">
-                <a:solidFill>
-                  <a:srgbClr val="323232"/>
-                </a:solidFill>
-              </a:defRPr>
-            </a:pPr>
-            <a:r>
-              <a:t>   ✓ Health validated</a:t>
-            </a:r>
-          </a:p>
-          <a:p>
-            <a:pPr>
-              <a:spcAft>
-                <a:spcPts val="800"/>
-              </a:spcAft>
-              <a:defRPr sz="2000">
-                <a:solidFill>
-                  <a:srgbClr val="323232"/>
-                </a:solidFill>
-              </a:defRPr>
-            </a:pPr>
-            <a:r>
-              <a:t>   ✓ Full rollout complete (2 pods)</a:t>
-            </a:r>
-          </a:p>
-          <a:p>
-            <a:pPr>
-              <a:spcAft>
-                <a:spcPts val="800"/>
-              </a:spcAft>
-              <a:defRPr sz="2000">
-                <a:solidFill>
-                  <a:srgbClr val="323232"/>
-                </a:solidFill>
-              </a:defRPr>
-            </a:pPr>
-          </a:p>
-          <a:p>
-            <a:pPr>
-              <a:spcAft>
-                <a:spcPts val="800"/>
-              </a:spcAft>
-              <a:defRPr sz="2000">
-                <a:solidFill>
-                  <a:srgbClr val="323232"/>
-                </a:solidFill>
-              </a:defRPr>
-            </a:pPr>
-            <a:r>
-              <a:t>[INSERT SCREENSHOT: screenshots/pipeline-executions.png]</a:t>
+              <a:defRPr sz="1600" b="1">
+                <a:solidFill>
+                  <a:srgbClr val="009682"/>
+                </a:solidFill>
+              </a:defRPr>
+            </a:pPr>
+            <a:r>
+              <a:t>CD Results: ✓ Canary ✓ Validate ✓ Rollout</a:t>
             </a:r>
           </a:p>
         </p:txBody>

</xml_diff>

<commit_message>
Add PowerPoint presentation with embedded screenshots
</commit_message>
<xml_diff>
--- a/Harness_Lab_Presentation.pptx
+++ b/Harness_Lab_Presentation.pptx
@@ -3262,179 +3262,9 @@
           </a:p>
         </p:txBody>
       </p:sp>
-      <p:graphicFrame>
-        <p:nvGraphicFramePr>
-          <p:cNvPr id="3" name="Table 2"/>
-          <p:cNvGraphicFramePr>
-            <a:graphicFrameLocks noGrp="1"/>
-          </p:cNvGraphicFramePr>
-          <p:nvPr/>
-        </p:nvGraphicFramePr>
-        <p:xfrm>
-          <a:off x="457200" y="914400"/>
-          <a:ext cx="6400800" cy="1645920"/>
-        </p:xfrm>
-        <a:graphic>
-          <a:graphicData uri="http://schemas.openxmlformats.org/drawingml/2006/table">
-            <a:tbl>
-              <a:tblPr firstRow="1" bandRow="1">
-                <a:tableStyleId>{5C22544A-7EE6-4342-B048-85BDC9FD1C3A}</a:tableStyleId>
-              </a:tblPr>
-              <a:tblGrid>
-                <a:gridCol w="3200400"/>
-                <a:gridCol w="3200400"/>
-              </a:tblGrid>
-              <a:tr h="411480">
-                <a:tc>
-                  <a:txBody>
-                    <a:bodyPr/>
-                    <a:lstStyle/>
-                    <a:p>
-                      <a:pPr>
-                        <a:defRPr b="1" sz="1200">
-                          <a:solidFill>
-                            <a:srgbClr val="FFFFFF"/>
-                          </a:solidFill>
-                        </a:defRPr>
-                      </a:pPr>
-                      <a:r>
-                        <a:t>Endpoint</a:t>
-                      </a:r>
-                    </a:p>
-                  </a:txBody>
-                  <a:tcPr>
-                    <a:solidFill>
-                      <a:srgbClr val="009682"/>
-                    </a:solidFill>
-                  </a:tcPr>
-                </a:tc>
-                <a:tc>
-                  <a:txBody>
-                    <a:bodyPr/>
-                    <a:lstStyle/>
-                    <a:p>
-                      <a:pPr>
-                        <a:defRPr b="1" sz="1200">
-                          <a:solidFill>
-                            <a:srgbClr val="FFFFFF"/>
-                          </a:solidFill>
-                        </a:defRPr>
-                      </a:pPr>
-                      <a:r>
-                        <a:t>Response</a:t>
-                      </a:r>
-                    </a:p>
-                  </a:txBody>
-                  <a:tcPr>
-                    <a:solidFill>
-                      <a:srgbClr val="009682"/>
-                    </a:solidFill>
-                  </a:tcPr>
-                </a:tc>
-              </a:tr>
-              <a:tr h="411480">
-                <a:tc>
-                  <a:txBody>
-                    <a:bodyPr/>
-                    <a:lstStyle/>
-                    <a:p>
-                      <a:pPr>
-                        <a:defRPr sz="1100"/>
-                      </a:pPr>
-                      <a:r>
-                        <a:t>GET /</a:t>
-                      </a:r>
-                    </a:p>
-                  </a:txBody>
-                  <a:tcPr/>
-                </a:tc>
-                <a:tc>
-                  <a:txBody>
-                    <a:bodyPr/>
-                    <a:lstStyle/>
-                    <a:p>
-                      <a:pPr>
-                        <a:defRPr sz="1100"/>
-                      </a:pPr>
-                      <a:r>
-                        <a:t>{"message":"Welcome to Harness CI Lab!"}</a:t>
-                      </a:r>
-                    </a:p>
-                  </a:txBody>
-                  <a:tcPr/>
-                </a:tc>
-              </a:tr>
-              <a:tr h="411480">
-                <a:tc>
-                  <a:txBody>
-                    <a:bodyPr/>
-                    <a:lstStyle/>
-                    <a:p>
-                      <a:pPr>
-                        <a:defRPr sz="1100"/>
-                      </a:pPr>
-                      <a:r>
-                        <a:t>GET /health</a:t>
-                      </a:r>
-                    </a:p>
-                  </a:txBody>
-                  <a:tcPr/>
-                </a:tc>
-                <a:tc>
-                  <a:txBody>
-                    <a:bodyPr/>
-                    <a:lstStyle/>
-                    <a:p>
-                      <a:pPr>
-                        <a:defRPr sz="1100"/>
-                      </a:pPr>
-                      <a:r>
-                        <a:t>{"status":"healthy"}</a:t>
-                      </a:r>
-                    </a:p>
-                  </a:txBody>
-                  <a:tcPr/>
-                </a:tc>
-              </a:tr>
-              <a:tr h="411480">
-                <a:tc>
-                  <a:txBody>
-                    <a:bodyPr/>
-                    <a:lstStyle/>
-                    <a:p>
-                      <a:pPr>
-                        <a:defRPr sz="1100"/>
-                      </a:pPr>
-                      <a:r>
-                        <a:t>GET /api/info</a:t>
-                      </a:r>
-                    </a:p>
-                  </a:txBody>
-                  <a:tcPr/>
-                </a:tc>
-                <a:tc>
-                  <a:txBody>
-                    <a:bodyPr/>
-                    <a:lstStyle/>
-                    <a:p>
-                      <a:pPr>
-                        <a:defRPr sz="1100"/>
-                      </a:pPr>
-                      <a:r>
-                        <a:t>{"app":"harness-ci-lab","version":"1.0.0"}</a:t>
-                      </a:r>
-                    </a:p>
-                  </a:txBody>
-                  <a:tcPr/>
-                </a:tc>
-              </a:tr>
-            </a:tbl>
-          </a:graphicData>
-        </a:graphic>
-      </p:graphicFrame>
       <p:pic>
         <p:nvPicPr>
-          <p:cNvPr id="4" name="Picture 3" descr="live-app-response.png"/>
+          <p:cNvPr id="3" name="Picture 2" descr="live-app-response.png"/>
           <p:cNvPicPr>
             <a:picLocks noChangeAspect="1"/>
           </p:cNvPicPr>
@@ -3448,8 +3278,8 @@
         </p:blipFill>
         <p:spPr>
           <a:xfrm>
-            <a:off x="7132320" y="914400"/>
-            <a:ext cx="4572000" cy="1540565"/>
+            <a:off x="457200" y="1188720"/>
+            <a:ext cx="11247120" cy="3789790"/>
           </a:xfrm>
           <a:prstGeom prst="rect">
             <a:avLst/>
@@ -3458,13 +3288,13 @@
       </p:pic>
       <p:sp>
         <p:nvSpPr>
-          <p:cNvPr id="5" name="TextBox 4"/>
+          <p:cNvPr id="4" name="TextBox 3"/>
           <p:cNvSpPr txBox="1"/>
           <p:nvPr/>
         </p:nvSpPr>
         <p:spPr>
           <a:xfrm>
-            <a:off x="457200" y="2926080"/>
+            <a:off x="457200" y="5029200"/>
             <a:ext cx="10972800" cy="914400"/>
           </a:xfrm>
           <a:prstGeom prst="rect">
@@ -3479,7 +3309,7 @@
           <a:lstStyle/>
           <a:p>
             <a:pPr>
-              <a:defRPr sz="1400">
+              <a:defRPr sz="1600">
                 <a:solidFill>
                   <a:srgbClr val="009682"/>
                 </a:solidFill>
@@ -5083,248 +4913,9 @@
           </a:p>
         </p:txBody>
       </p:sp>
-      <p:graphicFrame>
-        <p:nvGraphicFramePr>
-          <p:cNvPr id="3" name="Table 2"/>
-          <p:cNvGraphicFramePr>
-            <a:graphicFrameLocks noGrp="1"/>
-          </p:cNvGraphicFramePr>
-          <p:nvPr/>
-        </p:nvGraphicFramePr>
-        <p:xfrm>
-          <a:off x="457200" y="914400"/>
-          <a:ext cx="5486400" cy="1463040"/>
-        </p:xfrm>
-        <a:graphic>
-          <a:graphicData uri="http://schemas.openxmlformats.org/drawingml/2006/table">
-            <a:tbl>
-              <a:tblPr firstRow="1" bandRow="1">
-                <a:tableStyleId>{5C22544A-7EE6-4342-B048-85BDC9FD1C3A}</a:tableStyleId>
-              </a:tblPr>
-              <a:tblGrid>
-                <a:gridCol w="1828800"/>
-                <a:gridCol w="1828800"/>
-                <a:gridCol w="1828800"/>
-              </a:tblGrid>
-              <a:tr h="365760">
-                <a:tc>
-                  <a:txBody>
-                    <a:bodyPr/>
-                    <a:lstStyle/>
-                    <a:p>
-                      <a:pPr>
-                        <a:defRPr b="1" sz="1100">
-                          <a:solidFill>
-                            <a:srgbClr val="FFFFFF"/>
-                          </a:solidFill>
-                        </a:defRPr>
-                      </a:pPr>
-                      <a:r>
-                        <a:t>Connector</a:t>
-                      </a:r>
-                    </a:p>
-                  </a:txBody>
-                  <a:tcPr>
-                    <a:solidFill>
-                      <a:srgbClr val="009682"/>
-                    </a:solidFill>
-                  </a:tcPr>
-                </a:tc>
-                <a:tc>
-                  <a:txBody>
-                    <a:bodyPr/>
-                    <a:lstStyle/>
-                    <a:p>
-                      <a:pPr>
-                        <a:defRPr b="1" sz="1100">
-                          <a:solidFill>
-                            <a:srgbClr val="FFFFFF"/>
-                          </a:solidFill>
-                        </a:defRPr>
-                      </a:pPr>
-                      <a:r>
-                        <a:t>Purpose</a:t>
-                      </a:r>
-                    </a:p>
-                  </a:txBody>
-                  <a:tcPr>
-                    <a:solidFill>
-                      <a:srgbClr val="009682"/>
-                    </a:solidFill>
-                  </a:tcPr>
-                </a:tc>
-                <a:tc>
-                  <a:txBody>
-                    <a:bodyPr/>
-                    <a:lstStyle/>
-                    <a:p>
-                      <a:pPr>
-                        <a:defRPr b="1" sz="1100">
-                          <a:solidFill>
-                            <a:srgbClr val="FFFFFF"/>
-                          </a:solidFill>
-                        </a:defRPr>
-                      </a:pPr>
-                      <a:r>
-                        <a:t>Status</a:t>
-                      </a:r>
-                    </a:p>
-                  </a:txBody>
-                  <a:tcPr>
-                    <a:solidFill>
-                      <a:srgbClr val="009682"/>
-                    </a:solidFill>
-                  </a:tcPr>
-                </a:tc>
-              </a:tr>
-              <a:tr h="365760">
-                <a:tc>
-                  <a:txBody>
-                    <a:bodyPr/>
-                    <a:lstStyle/>
-                    <a:p>
-                      <a:pPr>
-                        <a:defRPr sz="1000"/>
-                      </a:pPr>
-                      <a:r>
-                        <a:t>github-connector</a:t>
-                      </a:r>
-                    </a:p>
-                  </a:txBody>
-                  <a:tcPr/>
-                </a:tc>
-                <a:tc>
-                  <a:txBody>
-                    <a:bodyPr/>
-                    <a:lstStyle/>
-                    <a:p>
-                      <a:pPr>
-                        <a:defRPr sz="1000"/>
-                      </a:pPr>
-                      <a:r>
-                        <a:t>Source code</a:t>
-                      </a:r>
-                    </a:p>
-                  </a:txBody>
-                  <a:tcPr/>
-                </a:tc>
-                <a:tc>
-                  <a:txBody>
-                    <a:bodyPr/>
-                    <a:lstStyle/>
-                    <a:p>
-                      <a:pPr>
-                        <a:defRPr sz="1000"/>
-                      </a:pPr>
-                      <a:r>
-                        <a:t>✓ Connected</a:t>
-                      </a:r>
-                    </a:p>
-                  </a:txBody>
-                  <a:tcPr/>
-                </a:tc>
-              </a:tr>
-              <a:tr h="365760">
-                <a:tc>
-                  <a:txBody>
-                    <a:bodyPr/>
-                    <a:lstStyle/>
-                    <a:p>
-                      <a:pPr>
-                        <a:defRPr sz="1000"/>
-                      </a:pPr>
-                      <a:r>
-                        <a:t>dockerhub-connector</a:t>
-                      </a:r>
-                    </a:p>
-                  </a:txBody>
-                  <a:tcPr/>
-                </a:tc>
-                <a:tc>
-                  <a:txBody>
-                    <a:bodyPr/>
-                    <a:lstStyle/>
-                    <a:p>
-                      <a:pPr>
-                        <a:defRPr sz="1000"/>
-                      </a:pPr>
-                      <a:r>
-                        <a:t>Container registry</a:t>
-                      </a:r>
-                    </a:p>
-                  </a:txBody>
-                  <a:tcPr/>
-                </a:tc>
-                <a:tc>
-                  <a:txBody>
-                    <a:bodyPr/>
-                    <a:lstStyle/>
-                    <a:p>
-                      <a:pPr>
-                        <a:defRPr sz="1000"/>
-                      </a:pPr>
-                      <a:r>
-                        <a:t>✓ Connected</a:t>
-                      </a:r>
-                    </a:p>
-                  </a:txBody>
-                  <a:tcPr/>
-                </a:tc>
-              </a:tr>
-              <a:tr h="365760">
-                <a:tc>
-                  <a:txBody>
-                    <a:bodyPr/>
-                    <a:lstStyle/>
-                    <a:p>
-                      <a:pPr>
-                        <a:defRPr sz="1000"/>
-                      </a:pPr>
-                      <a:r>
-                        <a:t>k8s-connector</a:t>
-                      </a:r>
-                    </a:p>
-                  </a:txBody>
-                  <a:tcPr/>
-                </a:tc>
-                <a:tc>
-                  <a:txBody>
-                    <a:bodyPr/>
-                    <a:lstStyle/>
-                    <a:p>
-                      <a:pPr>
-                        <a:defRPr sz="1000"/>
-                      </a:pPr>
-                      <a:r>
-                        <a:t>EKS cluster</a:t>
-                      </a:r>
-                    </a:p>
-                  </a:txBody>
-                  <a:tcPr/>
-                </a:tc>
-                <a:tc>
-                  <a:txBody>
-                    <a:bodyPr/>
-                    <a:lstStyle/>
-                    <a:p>
-                      <a:pPr>
-                        <a:defRPr sz="1000"/>
-                      </a:pPr>
-                      <a:r>
-                        <a:t>✓ Connected</a:t>
-                      </a:r>
-                    </a:p>
-                  </a:txBody>
-                  <a:tcPr/>
-                </a:tc>
-              </a:tr>
-            </a:tbl>
-          </a:graphicData>
-        </a:graphic>
-      </p:graphicFrame>
       <p:pic>
         <p:nvPicPr>
-          <p:cNvPr id="4" name="Picture 3" descr="connectors.png"/>
+          <p:cNvPr id="3" name="Picture 2" descr="connectors.png"/>
           <p:cNvPicPr>
             <a:picLocks noChangeAspect="1"/>
           </p:cNvPicPr>
@@ -5338,8 +4929,8 @@
         </p:blipFill>
         <p:spPr>
           <a:xfrm>
-            <a:off x="6217920" y="914400"/>
-            <a:ext cx="5486400" cy="2617963"/>
+            <a:off x="457200" y="1005840"/>
+            <a:ext cx="11247120" cy="5366825"/>
           </a:xfrm>
           <a:prstGeom prst="rect">
             <a:avLst/>
@@ -5399,137 +4990,9 @@
           </a:p>
         </p:txBody>
       </p:sp>
-      <p:sp>
-        <p:nvSpPr>
-          <p:cNvPr id="3" name="TextBox 2"/>
-          <p:cNvSpPr txBox="1"/>
-          <p:nvPr/>
-        </p:nvSpPr>
-        <p:spPr>
-          <a:xfrm>
-            <a:off x="457200" y="914400"/>
-            <a:ext cx="5029200" cy="3657600"/>
-          </a:xfrm>
-          <a:prstGeom prst="rect">
-            <a:avLst/>
-          </a:prstGeom>
-          <a:noFill/>
-        </p:spPr>
-        <p:txBody>
-          <a:bodyPr wrap="square">
-            <a:spAutoFit/>
-          </a:bodyPr>
-          <a:lstStyle/>
-          <a:p>
-            <a:pPr>
-              <a:defRPr sz="1600">
-                <a:solidFill>
-                  <a:srgbClr val="323232"/>
-                </a:solidFill>
-              </a:defRPr>
-            </a:pPr>
-            <a:r>
-              <a:t>Stage 1: CI (build-and-push)</a:t>
-            </a:r>
-          </a:p>
-          <a:p>
-            <a:pPr>
-              <a:defRPr sz="1600">
-                <a:solidFill>
-                  <a:srgbClr val="323232"/>
-                </a:solidFill>
-              </a:defRPr>
-            </a:pPr>
-            <a:r>
-              <a:t>   • Clone from GitHub</a:t>
-            </a:r>
-          </a:p>
-          <a:p>
-            <a:pPr>
-              <a:defRPr sz="1600">
-                <a:solidFill>
-                  <a:srgbClr val="323232"/>
-                </a:solidFill>
-              </a:defRPr>
-            </a:pPr>
-            <a:r>
-              <a:t>   • Run tests (npm test)</a:t>
-            </a:r>
-          </a:p>
-          <a:p>
-            <a:pPr>
-              <a:defRPr sz="1600">
-                <a:solidFill>
-                  <a:srgbClr val="323232"/>
-                </a:solidFill>
-              </a:defRPr>
-            </a:pPr>
-            <a:r>
-              <a:t>   • Build &amp; Push Docker image</a:t>
-            </a:r>
-          </a:p>
-          <a:p>
-            <a:pPr>
-              <a:defRPr sz="1600">
-                <a:solidFill>
-                  <a:srgbClr val="323232"/>
-                </a:solidFill>
-              </a:defRPr>
-            </a:pPr>
-          </a:p>
-          <a:p>
-            <a:pPr>
-              <a:defRPr sz="1600">
-                <a:solidFill>
-                  <a:srgbClr val="323232"/>
-                </a:solidFill>
-              </a:defRPr>
-            </a:pPr>
-            <a:r>
-              <a:t>Stage 2: CD (deploy-to-k8s)</a:t>
-            </a:r>
-          </a:p>
-          <a:p>
-            <a:pPr>
-              <a:defRPr sz="1600">
-                <a:solidFill>
-                  <a:srgbClr val="323232"/>
-                </a:solidFill>
-              </a:defRPr>
-            </a:pPr>
-            <a:r>
-              <a:t>   • Canary deployment (1 pod)</a:t>
-            </a:r>
-          </a:p>
-          <a:p>
-            <a:pPr>
-              <a:defRPr sz="1600">
-                <a:solidFill>
-                  <a:srgbClr val="323232"/>
-                </a:solidFill>
-              </a:defRPr>
-            </a:pPr>
-            <a:r>
-              <a:t>   • Validate health</a:t>
-            </a:r>
-          </a:p>
-          <a:p>
-            <a:pPr>
-              <a:defRPr sz="1600">
-                <a:solidFill>
-                  <a:srgbClr val="323232"/>
-                </a:solidFill>
-              </a:defRPr>
-            </a:pPr>
-            <a:r>
-              <a:t>   • Rolling deployment (all pods)</a:t>
-            </a:r>
-          </a:p>
-        </p:txBody>
-      </p:sp>
       <p:pic>
         <p:nvPicPr>
-          <p:cNvPr id="4" name="Picture 3" descr="pipeline-visual.png"/>
+          <p:cNvPr id="3" name="Picture 2" descr="pipeline-visual.png"/>
           <p:cNvPicPr>
             <a:picLocks noChangeAspect="1"/>
           </p:cNvPicPr>
@@ -5543,8 +5006,8 @@
         </p:blipFill>
         <p:spPr>
           <a:xfrm>
-            <a:off x="5760720" y="914400"/>
-            <a:ext cx="5943600" cy="3228891"/>
+            <a:off x="457200" y="1005840"/>
+            <a:ext cx="11247120" cy="6110056"/>
           </a:xfrm>
           <a:prstGeom prst="rect">
             <a:avLst/>
@@ -5938,76 +5401,6 @@
           </a:prstGeom>
         </p:spPr>
       </p:pic>
-      <p:sp>
-        <p:nvSpPr>
-          <p:cNvPr id="4" name="TextBox 3"/>
-          <p:cNvSpPr txBox="1"/>
-          <p:nvPr/>
-        </p:nvSpPr>
-        <p:spPr>
-          <a:xfrm>
-            <a:off x="457200" y="4572000"/>
-            <a:ext cx="5486400" cy="1828800"/>
-          </a:xfrm>
-          <a:prstGeom prst="rect">
-            <a:avLst/>
-          </a:prstGeom>
-          <a:noFill/>
-        </p:spPr>
-        <p:txBody>
-          <a:bodyPr wrap="none">
-            <a:spAutoFit/>
-          </a:bodyPr>
-          <a:lstStyle/>
-          <a:p>
-            <a:pPr>
-              <a:defRPr sz="1600" b="1">
-                <a:solidFill>
-                  <a:srgbClr val="009682"/>
-                </a:solidFill>
-              </a:defRPr>
-            </a:pPr>
-            <a:r>
-              <a:t>CI Results: ✓ Clone ✓ Test ✓ Push</a:t>
-            </a:r>
-          </a:p>
-        </p:txBody>
-      </p:sp>
-      <p:sp>
-        <p:nvSpPr>
-          <p:cNvPr id="5" name="TextBox 4"/>
-          <p:cNvSpPr txBox="1"/>
-          <p:nvPr/>
-        </p:nvSpPr>
-        <p:spPr>
-          <a:xfrm>
-            <a:off x="5943600" y="4572000"/>
-            <a:ext cx="5486400" cy="1828800"/>
-          </a:xfrm>
-          <a:prstGeom prst="rect">
-            <a:avLst/>
-          </a:prstGeom>
-          <a:noFill/>
-        </p:spPr>
-        <p:txBody>
-          <a:bodyPr wrap="none">
-            <a:spAutoFit/>
-          </a:bodyPr>
-          <a:lstStyle/>
-          <a:p>
-            <a:pPr>
-              <a:defRPr sz="1600" b="1">
-                <a:solidFill>
-                  <a:srgbClr val="009682"/>
-                </a:solidFill>
-              </a:defRPr>
-            </a:pPr>
-            <a:r>
-              <a:t>CD Results: ✓ Canary ✓ Validate ✓ Rollout</a:t>
-            </a:r>
-          </a:p>
-        </p:txBody>
-      </p:sp>
     </p:spTree>
   </p:cSld>
   <p:clrMapOvr>

</xml_diff>